<commit_message>
Added login functionalities through NUS OpenId.
</commit_message>
<xml_diff>
--- a/Mockup.pptx
+++ b/Mockup.pptx
@@ -308,7 +308,7 @@
             <a:fld id="{33A4DECE-A19E-AA4D-859B-2D2D3D6CA956}" type="datetimeFigureOut">
               <a:rPr lang="en-US" smtClean="0"/>
               <a:pPr/>
-              <a:t>3/25/13</a:t>
+              <a:t>3/29/13</a:t>
             </a:fld>
             <a:endParaRPr lang="en-US"/>
           </a:p>
@@ -508,7 +508,7 @@
             <a:fld id="{33A4DECE-A19E-AA4D-859B-2D2D3D6CA956}" type="datetimeFigureOut">
               <a:rPr lang="en-US" smtClean="0"/>
               <a:pPr/>
-              <a:t>3/25/13</a:t>
+              <a:t>3/29/13</a:t>
             </a:fld>
             <a:endParaRPr lang="en-US"/>
           </a:p>
@@ -713,7 +713,7 @@
             <a:fld id="{33A4DECE-A19E-AA4D-859B-2D2D3D6CA956}" type="datetimeFigureOut">
               <a:rPr lang="en-US" smtClean="0"/>
               <a:pPr/>
-              <a:t>3/25/13</a:t>
+              <a:t>3/29/13</a:t>
             </a:fld>
             <a:endParaRPr lang="en-US"/>
           </a:p>
@@ -980,7 +980,7 @@
             <a:fld id="{33A4DECE-A19E-AA4D-859B-2D2D3D6CA956}" type="datetimeFigureOut">
               <a:rPr lang="en-US" smtClean="0"/>
               <a:pPr/>
-              <a:t>3/25/13</a:t>
+              <a:t>3/29/13</a:t>
             </a:fld>
             <a:endParaRPr lang="en-US"/>
           </a:p>
@@ -1180,7 +1180,7 @@
             <a:fld id="{33A4DECE-A19E-AA4D-859B-2D2D3D6CA956}" type="datetimeFigureOut">
               <a:rPr lang="en-US" smtClean="0"/>
               <a:pPr/>
-              <a:t>3/25/13</a:t>
+              <a:t>3/29/13</a:t>
             </a:fld>
             <a:endParaRPr lang="en-US"/>
           </a:p>
@@ -1451,7 +1451,7 @@
             <a:fld id="{33A4DECE-A19E-AA4D-859B-2D2D3D6CA956}" type="datetimeFigureOut">
               <a:rPr lang="en-US" smtClean="0"/>
               <a:pPr/>
-              <a:t>3/25/13</a:t>
+              <a:t>3/29/13</a:t>
             </a:fld>
             <a:endParaRPr lang="en-US"/>
           </a:p>
@@ -1769,7 +1769,7 @@
             <a:fld id="{33A4DECE-A19E-AA4D-859B-2D2D3D6CA956}" type="datetimeFigureOut">
               <a:rPr lang="en-US" smtClean="0"/>
               <a:pPr/>
-              <a:t>3/25/13</a:t>
+              <a:t>3/29/13</a:t>
             </a:fld>
             <a:endParaRPr lang="en-US"/>
           </a:p>
@@ -2221,7 +2221,7 @@
             <a:fld id="{33A4DECE-A19E-AA4D-859B-2D2D3D6CA956}" type="datetimeFigureOut">
               <a:rPr lang="en-US" smtClean="0"/>
               <a:pPr/>
-              <a:t>3/25/13</a:t>
+              <a:t>3/29/13</a:t>
             </a:fld>
             <a:endParaRPr lang="en-US"/>
           </a:p>
@@ -2369,7 +2369,7 @@
             <a:fld id="{33A4DECE-A19E-AA4D-859B-2D2D3D6CA956}" type="datetimeFigureOut">
               <a:rPr lang="en-US" smtClean="0"/>
               <a:pPr/>
-              <a:t>3/25/13</a:t>
+              <a:t>3/29/13</a:t>
             </a:fld>
             <a:endParaRPr lang="en-US"/>
           </a:p>
@@ -2486,7 +2486,7 @@
             <a:fld id="{33A4DECE-A19E-AA4D-859B-2D2D3D6CA956}" type="datetimeFigureOut">
               <a:rPr lang="en-US" smtClean="0"/>
               <a:pPr/>
-              <a:t>3/25/13</a:t>
+              <a:t>3/29/13</a:t>
             </a:fld>
             <a:endParaRPr lang="en-US"/>
           </a:p>
@@ -2788,7 +2788,7 @@
             <a:fld id="{33A4DECE-A19E-AA4D-859B-2D2D3D6CA956}" type="datetimeFigureOut">
               <a:rPr lang="en-US" smtClean="0"/>
               <a:pPr/>
-              <a:t>3/25/13</a:t>
+              <a:t>3/29/13</a:t>
             </a:fld>
             <a:endParaRPr lang="en-US"/>
           </a:p>
@@ -2988,7 +2988,7 @@
             <a:fld id="{33A4DECE-A19E-AA4D-859B-2D2D3D6CA956}" type="datetimeFigureOut">
               <a:rPr lang="en-US" smtClean="0"/>
               <a:pPr/>
-              <a:t>3/25/13</a:t>
+              <a:t>3/29/13</a:t>
             </a:fld>
             <a:endParaRPr lang="en-US"/>
           </a:p>
@@ -3266,7 +3266,7 @@
             <a:fld id="{33A4DECE-A19E-AA4D-859B-2D2D3D6CA956}" type="datetimeFigureOut">
               <a:rPr lang="en-US" smtClean="0"/>
               <a:pPr/>
-              <a:t>3/25/13</a:t>
+              <a:t>3/29/13</a:t>
             </a:fld>
             <a:endParaRPr lang="en-US"/>
           </a:p>
@@ -3466,7 +3466,7 @@
             <a:fld id="{33A4DECE-A19E-AA4D-859B-2D2D3D6CA956}" type="datetimeFigureOut">
               <a:rPr lang="en-US" smtClean="0"/>
               <a:pPr/>
-              <a:t>3/25/13</a:t>
+              <a:t>3/29/13</a:t>
             </a:fld>
             <a:endParaRPr lang="en-US"/>
           </a:p>
@@ -3671,7 +3671,7 @@
             <a:fld id="{33A4DECE-A19E-AA4D-859B-2D2D3D6CA956}" type="datetimeFigureOut">
               <a:rPr lang="en-US" smtClean="0"/>
               <a:pPr/>
-              <a:t>3/25/13</a:t>
+              <a:t>3/29/13</a:t>
             </a:fld>
             <a:endParaRPr lang="en-US"/>
           </a:p>
@@ -3942,7 +3942,7 @@
             <a:fld id="{33A4DECE-A19E-AA4D-859B-2D2D3D6CA956}" type="datetimeFigureOut">
               <a:rPr lang="en-US" smtClean="0"/>
               <a:pPr/>
-              <a:t>3/25/13</a:t>
+              <a:t>3/29/13</a:t>
             </a:fld>
             <a:endParaRPr lang="en-US"/>
           </a:p>
@@ -4260,7 +4260,7 @@
             <a:fld id="{33A4DECE-A19E-AA4D-859B-2D2D3D6CA956}" type="datetimeFigureOut">
               <a:rPr lang="en-US" smtClean="0"/>
               <a:pPr/>
-              <a:t>3/25/13</a:t>
+              <a:t>3/29/13</a:t>
             </a:fld>
             <a:endParaRPr lang="en-US"/>
           </a:p>
@@ -4712,7 +4712,7 @@
             <a:fld id="{33A4DECE-A19E-AA4D-859B-2D2D3D6CA956}" type="datetimeFigureOut">
               <a:rPr lang="en-US" smtClean="0"/>
               <a:pPr/>
-              <a:t>3/25/13</a:t>
+              <a:t>3/29/13</a:t>
             </a:fld>
             <a:endParaRPr lang="en-US"/>
           </a:p>
@@ -4860,7 +4860,7 @@
             <a:fld id="{33A4DECE-A19E-AA4D-859B-2D2D3D6CA956}" type="datetimeFigureOut">
               <a:rPr lang="en-US" smtClean="0"/>
               <a:pPr/>
-              <a:t>3/25/13</a:t>
+              <a:t>3/29/13</a:t>
             </a:fld>
             <a:endParaRPr lang="en-US"/>
           </a:p>
@@ -4977,7 +4977,7 @@
             <a:fld id="{33A4DECE-A19E-AA4D-859B-2D2D3D6CA956}" type="datetimeFigureOut">
               <a:rPr lang="en-US" smtClean="0"/>
               <a:pPr/>
-              <a:t>3/25/13</a:t>
+              <a:t>3/29/13</a:t>
             </a:fld>
             <a:endParaRPr lang="en-US"/>
           </a:p>
@@ -5279,7 +5279,7 @@
             <a:fld id="{33A4DECE-A19E-AA4D-859B-2D2D3D6CA956}" type="datetimeFigureOut">
               <a:rPr lang="en-US" smtClean="0"/>
               <a:pPr/>
-              <a:t>3/25/13</a:t>
+              <a:t>3/29/13</a:t>
             </a:fld>
             <a:endParaRPr lang="en-US"/>
           </a:p>
@@ -5557,7 +5557,7 @@
             <a:fld id="{33A4DECE-A19E-AA4D-859B-2D2D3D6CA956}" type="datetimeFigureOut">
               <a:rPr lang="en-US" smtClean="0"/>
               <a:pPr/>
-              <a:t>3/25/13</a:t>
+              <a:t>3/29/13</a:t>
             </a:fld>
             <a:endParaRPr lang="en-US"/>
           </a:p>
@@ -5927,7 +5927,7 @@
             <a:fld id="{33A4DECE-A19E-AA4D-859B-2D2D3D6CA956}" type="datetimeFigureOut">
               <a:rPr lang="en-US" smtClean="0"/>
               <a:pPr/>
-              <a:t>3/25/13</a:t>
+              <a:t>3/29/13</a:t>
             </a:fld>
             <a:endParaRPr lang="en-US" dirty="0"/>
           </a:p>
@@ -6499,7 +6499,7 @@
             <a:fld id="{33A4DECE-A19E-AA4D-859B-2D2D3D6CA956}" type="datetimeFigureOut">
               <a:rPr lang="en-US" smtClean="0"/>
               <a:pPr/>
-              <a:t>3/25/13</a:t>
+              <a:t>3/29/13</a:t>
             </a:fld>
             <a:endParaRPr lang="en-US" dirty="0"/>
           </a:p>
@@ -7047,15 +7047,15 @@
             </a:pPr>
             <a:r>
               <a:rPr lang="en-US" sz="2000" dirty="0" smtClean="0"/>
-              <a:t>The system is restricted for use to </a:t>
-            </a:r>
-            <a:r>
-              <a:rPr lang="en-US" sz="2000" dirty="0" err="1" smtClean="0"/>
-              <a:t>SoC</a:t>
+              <a:t>The system is restricted for use </a:t>
+            </a:r>
+            <a:r>
+              <a:rPr lang="en-US" sz="2000" smtClean="0"/>
+              <a:t>to NUS students</a:t>
             </a:r>
             <a:r>
               <a:rPr lang="en-US" sz="2000" dirty="0" smtClean="0"/>
-              <a:t> students.</a:t>
+              <a:t>.</a:t>
             </a:r>
           </a:p>
           <a:p>

</xml_diff>